<commit_message>
Day 3 Details updated
</commit_message>
<xml_diff>
--- a/Day3/DockerAndKubernetes_Training-day3.pptx
+++ b/Day3/DockerAndKubernetes_Training-day3.pptx
@@ -5,23 +5,24 @@
     <p:sldMasterId id="2147483880" r:id="rId1"/>
   </p:sldMasterIdLst>
   <p:notesMasterIdLst>
-    <p:notesMasterId r:id="rId16"/>
+    <p:notesMasterId r:id="rId17"/>
   </p:notesMasterIdLst>
   <p:sldIdLst>
     <p:sldId id="414" r:id="rId2"/>
     <p:sldId id="415" r:id="rId3"/>
     <p:sldId id="262" r:id="rId4"/>
-    <p:sldId id="263" r:id="rId5"/>
-    <p:sldId id="291" r:id="rId6"/>
-    <p:sldId id="292" r:id="rId7"/>
-    <p:sldId id="382" r:id="rId8"/>
-    <p:sldId id="383" r:id="rId9"/>
-    <p:sldId id="384" r:id="rId10"/>
-    <p:sldId id="385" r:id="rId11"/>
-    <p:sldId id="402" r:id="rId12"/>
-    <p:sldId id="399" r:id="rId13"/>
-    <p:sldId id="264" r:id="rId14"/>
-    <p:sldId id="417" r:id="rId15"/>
+    <p:sldId id="418" r:id="rId5"/>
+    <p:sldId id="263" r:id="rId6"/>
+    <p:sldId id="291" r:id="rId7"/>
+    <p:sldId id="292" r:id="rId8"/>
+    <p:sldId id="382" r:id="rId9"/>
+    <p:sldId id="383" r:id="rId10"/>
+    <p:sldId id="384" r:id="rId11"/>
+    <p:sldId id="385" r:id="rId12"/>
+    <p:sldId id="402" r:id="rId13"/>
+    <p:sldId id="399" r:id="rId14"/>
+    <p:sldId id="264" r:id="rId15"/>
+    <p:sldId id="417" r:id="rId16"/>
   </p:sldIdLst>
   <p:sldSz cx="12192000" cy="6858000"/>
   <p:notesSz cx="6858000" cy="9144000"/>
@@ -742,7 +743,7 @@
                 </a:solidFill>
               </a:rPr>
               <a:pPr/>
-              <a:t>7</a:t>
+              <a:t>8</a:t>
             </a:fld>
             <a:endParaRPr lang="en-US">
               <a:solidFill>
@@ -14020,6 +14021,938 @@
 </file>
 
 <file path=ppt/slides/slide10.xml><?xml version="1.0" encoding="utf-8"?>
+<p:sld xmlns:a="http://schemas.openxmlformats.org/drawingml/2006/main" xmlns:r="http://schemas.openxmlformats.org/officeDocument/2006/relationships" xmlns:p="http://schemas.openxmlformats.org/presentationml/2006/main">
+  <p:cSld>
+    <p:spTree>
+      <p:nvGrpSpPr>
+        <p:cNvPr id="1" name=""/>
+        <p:cNvGrpSpPr/>
+        <p:nvPr/>
+      </p:nvGrpSpPr>
+      <p:grpSpPr>
+        <a:xfrm>
+          <a:off x="0" y="0"/>
+          <a:ext cx="0" cy="0"/>
+          <a:chOff x="0" y="0"/>
+          <a:chExt cx="0" cy="0"/>
+        </a:xfrm>
+      </p:grpSpPr>
+      <p:sp>
+        <p:nvSpPr>
+          <p:cNvPr id="4" name="Title 1">
+            <a:extLst>
+              <a:ext uri="{FF2B5EF4-FFF2-40B4-BE49-F238E27FC236}">
+                <a16:creationId xmlns:a16="http://schemas.microsoft.com/office/drawing/2014/main" id="{84823479-A31A-9A25-B7F5-EFCABE23D8F6}"/>
+              </a:ext>
+            </a:extLst>
+          </p:cNvPr>
+          <p:cNvSpPr>
+            <a:spLocks noGrp="1"/>
+          </p:cNvSpPr>
+          <p:nvPr>
+            <p:ph type="title"/>
+          </p:nvPr>
+        </p:nvSpPr>
+        <p:spPr>
+          <a:xfrm>
+            <a:off x="832976" y="929923"/>
+            <a:ext cx="8761413" cy="706964"/>
+          </a:xfrm>
+        </p:spPr>
+        <p:txBody>
+          <a:bodyPr>
+            <a:normAutofit/>
+          </a:bodyPr>
+          <a:lstStyle/>
+          <a:p>
+            <a:r>
+              <a:rPr lang="en-US" dirty="0"/>
+              <a:t>DOCKER CONTAINER</a:t>
+            </a:r>
+            <a:endParaRPr lang="en-IN" dirty="0"/>
+          </a:p>
+        </p:txBody>
+      </p:sp>
+      <p:sp>
+        <p:nvSpPr>
+          <p:cNvPr id="3" name="Content Placeholder 2"/>
+          <p:cNvSpPr>
+            <a:spLocks noGrp="1"/>
+          </p:cNvSpPr>
+          <p:nvPr>
+            <p:ph idx="1"/>
+          </p:nvPr>
+        </p:nvSpPr>
+        <p:spPr>
+          <a:xfrm>
+            <a:off x="395118" y="2278499"/>
+            <a:ext cx="10017361" cy="3836697"/>
+          </a:xfrm>
+        </p:spPr>
+        <p:txBody>
+          <a:bodyPr anchor="t"/>
+          <a:lstStyle/>
+          <a:p>
+            <a:r>
+              <a:rPr lang="en-US" dirty="0">
+                <a:solidFill>
+                  <a:srgbClr val="31859C"/>
+                </a:solidFill>
+              </a:rPr>
+              <a:t>Isolated application platform</a:t>
+            </a:r>
+          </a:p>
+          <a:p>
+            <a:r>
+              <a:rPr lang="en-US" dirty="0">
+                <a:solidFill>
+                  <a:srgbClr val="31859C"/>
+                </a:solidFill>
+              </a:rPr>
+              <a:t>Containers everything needed to run you application</a:t>
+            </a:r>
+          </a:p>
+          <a:p>
+            <a:r>
+              <a:rPr lang="en-US" dirty="0">
+                <a:solidFill>
+                  <a:srgbClr val="31859C"/>
+                </a:solidFill>
+              </a:rPr>
+              <a:t>Based on one or more images</a:t>
+            </a:r>
+          </a:p>
+          <a:p>
+            <a:r>
+              <a:rPr lang="en-US" dirty="0">
+                <a:solidFill>
+                  <a:srgbClr val="31859C"/>
+                </a:solidFill>
+              </a:rPr>
+              <a:t>Docker containers launched from Docker image</a:t>
+            </a:r>
+          </a:p>
+          <a:p>
+            <a:r>
+              <a:rPr lang="en-US" dirty="0">
+                <a:solidFill>
+                  <a:srgbClr val="31859C"/>
+                </a:solidFill>
+              </a:rPr>
+              <a:t>When Docker container runs, it adds a read-write layer on top of the image</a:t>
+            </a:r>
+          </a:p>
+        </p:txBody>
+      </p:sp>
+      <p:pic>
+        <p:nvPicPr>
+          <p:cNvPr id="2" name="Picture 1"/>
+          <p:cNvPicPr>
+            <a:picLocks noChangeAspect="1"/>
+          </p:cNvPicPr>
+          <p:nvPr/>
+        </p:nvPicPr>
+        <p:blipFill>
+          <a:blip r:embed="rId2">
+            <a:alphaModFix/>
+            <a:extLst>
+              <a:ext uri="{28A0092B-C50C-407E-A947-70E740481C1C}">
+                <a14:useLocalDpi xmlns:a14="http://schemas.microsoft.com/office/drawing/2010/main" val="0"/>
+              </a:ext>
+            </a:extLst>
+          </a:blip>
+          <a:stretch>
+            <a:fillRect/>
+          </a:stretch>
+        </p:blipFill>
+        <p:spPr>
+          <a:xfrm>
+            <a:off x="4796590" y="4405395"/>
+            <a:ext cx="6976980" cy="2277353"/>
+          </a:xfrm>
+          <a:prstGeom prst="rect">
+            <a:avLst/>
+          </a:prstGeom>
+          <a:noFill/>
+          <a:ln>
+            <a:solidFill>
+              <a:schemeClr val="tx1"/>
+            </a:solidFill>
+          </a:ln>
+          <a:effectLst>
+            <a:outerShdw blurRad="63500" sx="102000" sy="102000" algn="ctr" rotWithShape="0">
+              <a:prstClr val="black">
+                <a:alpha val="40000"/>
+              </a:prstClr>
+            </a:outerShdw>
+          </a:effectLst>
+        </p:spPr>
+      </p:pic>
+    </p:spTree>
+    <p:extLst>
+      <p:ext uri="{BB962C8B-B14F-4D97-AF65-F5344CB8AC3E}">
+        <p14:creationId xmlns:p14="http://schemas.microsoft.com/office/powerpoint/2010/main" val="1136863945"/>
+      </p:ext>
+    </p:extLst>
+  </p:cSld>
+  <p:clrMapOvr>
+    <a:masterClrMapping/>
+  </p:clrMapOvr>
+  <mc:AlternateContent xmlns:mc="http://schemas.openxmlformats.org/markup-compatibility/2006" xmlns:p14="http://schemas.microsoft.com/office/powerpoint/2010/main">
+    <mc:Choice Requires="p14">
+      <p:transition spd="med" p14:dur="700">
+        <p:fade/>
+      </p:transition>
+    </mc:Choice>
+    <mc:Fallback xmlns="">
+      <p:transition spd="med">
+        <p:fade/>
+      </p:transition>
+    </mc:Fallback>
+  </mc:AlternateContent>
+  <p:timing>
+    <p:tnLst>
+      <p:par>
+        <p:cTn id="1" dur="indefinite" restart="never" nodeType="tmRoot">
+          <p:childTnLst>
+            <p:seq concurrent="1" nextAc="seek">
+              <p:cTn id="2" dur="indefinite" nodeType="mainSeq">
+                <p:childTnLst>
+                  <p:par>
+                    <p:cTn id="3" fill="hold">
+                      <p:stCondLst>
+                        <p:cond delay="indefinite"/>
+                      </p:stCondLst>
+                      <p:childTnLst>
+                        <p:par>
+                          <p:cTn id="4" fill="hold">
+                            <p:stCondLst>
+                              <p:cond delay="0"/>
+                            </p:stCondLst>
+                            <p:childTnLst>
+                              <p:par>
+                                <p:cTn id="5" presetID="2" presetClass="entr" presetSubtype="4" fill="hold" grpId="0" nodeType="clickEffect">
+                                  <p:stCondLst>
+                                    <p:cond delay="0"/>
+                                  </p:stCondLst>
+                                  <p:childTnLst>
+                                    <p:set>
+                                      <p:cBhvr>
+                                        <p:cTn id="6" dur="1" fill="hold">
+                                          <p:stCondLst>
+                                            <p:cond delay="0"/>
+                                          </p:stCondLst>
+                                        </p:cTn>
+                                        <p:tgtEl>
+                                          <p:spTgt spid="4"/>
+                                        </p:tgtEl>
+                                        <p:attrNameLst>
+                                          <p:attrName>style.visibility</p:attrName>
+                                        </p:attrNameLst>
+                                      </p:cBhvr>
+                                      <p:to>
+                                        <p:strVal val="visible"/>
+                                      </p:to>
+                                    </p:set>
+                                    <p:anim calcmode="lin" valueType="num">
+                                      <p:cBhvr additive="base">
+                                        <p:cTn id="7" dur="500" fill="hold"/>
+                                        <p:tgtEl>
+                                          <p:spTgt spid="4"/>
+                                        </p:tgtEl>
+                                        <p:attrNameLst>
+                                          <p:attrName>ppt_x</p:attrName>
+                                        </p:attrNameLst>
+                                      </p:cBhvr>
+                                      <p:tavLst>
+                                        <p:tav tm="0">
+                                          <p:val>
+                                            <p:strVal val="#ppt_x"/>
+                                          </p:val>
+                                        </p:tav>
+                                        <p:tav tm="100000">
+                                          <p:val>
+                                            <p:strVal val="#ppt_x"/>
+                                          </p:val>
+                                        </p:tav>
+                                      </p:tavLst>
+                                    </p:anim>
+                                    <p:anim calcmode="lin" valueType="num">
+                                      <p:cBhvr additive="base">
+                                        <p:cTn id="8" dur="500" fill="hold"/>
+                                        <p:tgtEl>
+                                          <p:spTgt spid="4"/>
+                                        </p:tgtEl>
+                                        <p:attrNameLst>
+                                          <p:attrName>ppt_y</p:attrName>
+                                        </p:attrNameLst>
+                                      </p:cBhvr>
+                                      <p:tavLst>
+                                        <p:tav tm="0">
+                                          <p:val>
+                                            <p:strVal val="1+#ppt_h/2"/>
+                                          </p:val>
+                                        </p:tav>
+                                        <p:tav tm="100000">
+                                          <p:val>
+                                            <p:strVal val="#ppt_y"/>
+                                          </p:val>
+                                        </p:tav>
+                                      </p:tavLst>
+                                    </p:anim>
+                                  </p:childTnLst>
+                                </p:cTn>
+                              </p:par>
+                            </p:childTnLst>
+                          </p:cTn>
+                        </p:par>
+                      </p:childTnLst>
+                    </p:cTn>
+                  </p:par>
+                  <p:par>
+                    <p:cTn id="9" fill="hold">
+                      <p:stCondLst>
+                        <p:cond delay="indefinite"/>
+                      </p:stCondLst>
+                      <p:childTnLst>
+                        <p:par>
+                          <p:cTn id="10" fill="hold">
+                            <p:stCondLst>
+                              <p:cond delay="0"/>
+                            </p:stCondLst>
+                            <p:childTnLst>
+                              <p:par>
+                                <p:cTn id="11" presetID="2" presetClass="entr" presetSubtype="4" fill="hold" grpId="0" nodeType="clickEffect">
+                                  <p:stCondLst>
+                                    <p:cond delay="0"/>
+                                  </p:stCondLst>
+                                  <p:childTnLst>
+                                    <p:set>
+                                      <p:cBhvr>
+                                        <p:cTn id="12" dur="1" fill="hold">
+                                          <p:stCondLst>
+                                            <p:cond delay="0"/>
+                                          </p:stCondLst>
+                                        </p:cTn>
+                                        <p:tgtEl>
+                                          <p:spTgt spid="3">
+                                            <p:txEl>
+                                              <p:pRg st="0" end="0"/>
+                                            </p:txEl>
+                                          </p:spTgt>
+                                        </p:tgtEl>
+                                        <p:attrNameLst>
+                                          <p:attrName>style.visibility</p:attrName>
+                                        </p:attrNameLst>
+                                      </p:cBhvr>
+                                      <p:to>
+                                        <p:strVal val="visible"/>
+                                      </p:to>
+                                    </p:set>
+                                    <p:anim calcmode="lin" valueType="num">
+                                      <p:cBhvr additive="base">
+                                        <p:cTn id="13" dur="500" fill="hold"/>
+                                        <p:tgtEl>
+                                          <p:spTgt spid="3">
+                                            <p:txEl>
+                                              <p:pRg st="0" end="0"/>
+                                            </p:txEl>
+                                          </p:spTgt>
+                                        </p:tgtEl>
+                                        <p:attrNameLst>
+                                          <p:attrName>ppt_x</p:attrName>
+                                        </p:attrNameLst>
+                                      </p:cBhvr>
+                                      <p:tavLst>
+                                        <p:tav tm="0">
+                                          <p:val>
+                                            <p:strVal val="#ppt_x"/>
+                                          </p:val>
+                                        </p:tav>
+                                        <p:tav tm="100000">
+                                          <p:val>
+                                            <p:strVal val="#ppt_x"/>
+                                          </p:val>
+                                        </p:tav>
+                                      </p:tavLst>
+                                    </p:anim>
+                                    <p:anim calcmode="lin" valueType="num">
+                                      <p:cBhvr additive="base">
+                                        <p:cTn id="14" dur="500" fill="hold"/>
+                                        <p:tgtEl>
+                                          <p:spTgt spid="3">
+                                            <p:txEl>
+                                              <p:pRg st="0" end="0"/>
+                                            </p:txEl>
+                                          </p:spTgt>
+                                        </p:tgtEl>
+                                        <p:attrNameLst>
+                                          <p:attrName>ppt_y</p:attrName>
+                                        </p:attrNameLst>
+                                      </p:cBhvr>
+                                      <p:tavLst>
+                                        <p:tav tm="0">
+                                          <p:val>
+                                            <p:strVal val="1+#ppt_h/2"/>
+                                          </p:val>
+                                        </p:tav>
+                                        <p:tav tm="100000">
+                                          <p:val>
+                                            <p:strVal val="#ppt_y"/>
+                                          </p:val>
+                                        </p:tav>
+                                      </p:tavLst>
+                                    </p:anim>
+                                  </p:childTnLst>
+                                </p:cTn>
+                              </p:par>
+                            </p:childTnLst>
+                          </p:cTn>
+                        </p:par>
+                      </p:childTnLst>
+                    </p:cTn>
+                  </p:par>
+                  <p:par>
+                    <p:cTn id="15" fill="hold">
+                      <p:stCondLst>
+                        <p:cond delay="indefinite"/>
+                      </p:stCondLst>
+                      <p:childTnLst>
+                        <p:par>
+                          <p:cTn id="16" fill="hold">
+                            <p:stCondLst>
+                              <p:cond delay="0"/>
+                            </p:stCondLst>
+                            <p:childTnLst>
+                              <p:par>
+                                <p:cTn id="17" presetID="2" presetClass="entr" presetSubtype="4" fill="hold" grpId="0" nodeType="clickEffect">
+                                  <p:stCondLst>
+                                    <p:cond delay="0"/>
+                                  </p:stCondLst>
+                                  <p:childTnLst>
+                                    <p:set>
+                                      <p:cBhvr>
+                                        <p:cTn id="18" dur="1" fill="hold">
+                                          <p:stCondLst>
+                                            <p:cond delay="0"/>
+                                          </p:stCondLst>
+                                        </p:cTn>
+                                        <p:tgtEl>
+                                          <p:spTgt spid="3">
+                                            <p:txEl>
+                                              <p:pRg st="1" end="1"/>
+                                            </p:txEl>
+                                          </p:spTgt>
+                                        </p:tgtEl>
+                                        <p:attrNameLst>
+                                          <p:attrName>style.visibility</p:attrName>
+                                        </p:attrNameLst>
+                                      </p:cBhvr>
+                                      <p:to>
+                                        <p:strVal val="visible"/>
+                                      </p:to>
+                                    </p:set>
+                                    <p:anim calcmode="lin" valueType="num">
+                                      <p:cBhvr additive="base">
+                                        <p:cTn id="19" dur="500" fill="hold"/>
+                                        <p:tgtEl>
+                                          <p:spTgt spid="3">
+                                            <p:txEl>
+                                              <p:pRg st="1" end="1"/>
+                                            </p:txEl>
+                                          </p:spTgt>
+                                        </p:tgtEl>
+                                        <p:attrNameLst>
+                                          <p:attrName>ppt_x</p:attrName>
+                                        </p:attrNameLst>
+                                      </p:cBhvr>
+                                      <p:tavLst>
+                                        <p:tav tm="0">
+                                          <p:val>
+                                            <p:strVal val="#ppt_x"/>
+                                          </p:val>
+                                        </p:tav>
+                                        <p:tav tm="100000">
+                                          <p:val>
+                                            <p:strVal val="#ppt_x"/>
+                                          </p:val>
+                                        </p:tav>
+                                      </p:tavLst>
+                                    </p:anim>
+                                    <p:anim calcmode="lin" valueType="num">
+                                      <p:cBhvr additive="base">
+                                        <p:cTn id="20" dur="500" fill="hold"/>
+                                        <p:tgtEl>
+                                          <p:spTgt spid="3">
+                                            <p:txEl>
+                                              <p:pRg st="1" end="1"/>
+                                            </p:txEl>
+                                          </p:spTgt>
+                                        </p:tgtEl>
+                                        <p:attrNameLst>
+                                          <p:attrName>ppt_y</p:attrName>
+                                        </p:attrNameLst>
+                                      </p:cBhvr>
+                                      <p:tavLst>
+                                        <p:tav tm="0">
+                                          <p:val>
+                                            <p:strVal val="1+#ppt_h/2"/>
+                                          </p:val>
+                                        </p:tav>
+                                        <p:tav tm="100000">
+                                          <p:val>
+                                            <p:strVal val="#ppt_y"/>
+                                          </p:val>
+                                        </p:tav>
+                                      </p:tavLst>
+                                    </p:anim>
+                                  </p:childTnLst>
+                                </p:cTn>
+                              </p:par>
+                            </p:childTnLst>
+                          </p:cTn>
+                        </p:par>
+                      </p:childTnLst>
+                    </p:cTn>
+                  </p:par>
+                  <p:par>
+                    <p:cTn id="21" fill="hold">
+                      <p:stCondLst>
+                        <p:cond delay="indefinite"/>
+                      </p:stCondLst>
+                      <p:childTnLst>
+                        <p:par>
+                          <p:cTn id="22" fill="hold">
+                            <p:stCondLst>
+                              <p:cond delay="0"/>
+                            </p:stCondLst>
+                            <p:childTnLst>
+                              <p:par>
+                                <p:cTn id="23" presetID="2" presetClass="entr" presetSubtype="4" fill="hold" grpId="0" nodeType="clickEffect">
+                                  <p:stCondLst>
+                                    <p:cond delay="0"/>
+                                  </p:stCondLst>
+                                  <p:childTnLst>
+                                    <p:set>
+                                      <p:cBhvr>
+                                        <p:cTn id="24" dur="1" fill="hold">
+                                          <p:stCondLst>
+                                            <p:cond delay="0"/>
+                                          </p:stCondLst>
+                                        </p:cTn>
+                                        <p:tgtEl>
+                                          <p:spTgt spid="3">
+                                            <p:txEl>
+                                              <p:pRg st="2" end="2"/>
+                                            </p:txEl>
+                                          </p:spTgt>
+                                        </p:tgtEl>
+                                        <p:attrNameLst>
+                                          <p:attrName>style.visibility</p:attrName>
+                                        </p:attrNameLst>
+                                      </p:cBhvr>
+                                      <p:to>
+                                        <p:strVal val="visible"/>
+                                      </p:to>
+                                    </p:set>
+                                    <p:anim calcmode="lin" valueType="num">
+                                      <p:cBhvr additive="base">
+                                        <p:cTn id="25" dur="500" fill="hold"/>
+                                        <p:tgtEl>
+                                          <p:spTgt spid="3">
+                                            <p:txEl>
+                                              <p:pRg st="2" end="2"/>
+                                            </p:txEl>
+                                          </p:spTgt>
+                                        </p:tgtEl>
+                                        <p:attrNameLst>
+                                          <p:attrName>ppt_x</p:attrName>
+                                        </p:attrNameLst>
+                                      </p:cBhvr>
+                                      <p:tavLst>
+                                        <p:tav tm="0">
+                                          <p:val>
+                                            <p:strVal val="#ppt_x"/>
+                                          </p:val>
+                                        </p:tav>
+                                        <p:tav tm="100000">
+                                          <p:val>
+                                            <p:strVal val="#ppt_x"/>
+                                          </p:val>
+                                        </p:tav>
+                                      </p:tavLst>
+                                    </p:anim>
+                                    <p:anim calcmode="lin" valueType="num">
+                                      <p:cBhvr additive="base">
+                                        <p:cTn id="26" dur="500" fill="hold"/>
+                                        <p:tgtEl>
+                                          <p:spTgt spid="3">
+                                            <p:txEl>
+                                              <p:pRg st="2" end="2"/>
+                                            </p:txEl>
+                                          </p:spTgt>
+                                        </p:tgtEl>
+                                        <p:attrNameLst>
+                                          <p:attrName>ppt_y</p:attrName>
+                                        </p:attrNameLst>
+                                      </p:cBhvr>
+                                      <p:tavLst>
+                                        <p:tav tm="0">
+                                          <p:val>
+                                            <p:strVal val="1+#ppt_h/2"/>
+                                          </p:val>
+                                        </p:tav>
+                                        <p:tav tm="100000">
+                                          <p:val>
+                                            <p:strVal val="#ppt_y"/>
+                                          </p:val>
+                                        </p:tav>
+                                      </p:tavLst>
+                                    </p:anim>
+                                  </p:childTnLst>
+                                </p:cTn>
+                              </p:par>
+                            </p:childTnLst>
+                          </p:cTn>
+                        </p:par>
+                      </p:childTnLst>
+                    </p:cTn>
+                  </p:par>
+                  <p:par>
+                    <p:cTn id="27" fill="hold">
+                      <p:stCondLst>
+                        <p:cond delay="indefinite"/>
+                      </p:stCondLst>
+                      <p:childTnLst>
+                        <p:par>
+                          <p:cTn id="28" fill="hold">
+                            <p:stCondLst>
+                              <p:cond delay="0"/>
+                            </p:stCondLst>
+                            <p:childTnLst>
+                              <p:par>
+                                <p:cTn id="29" presetID="2" presetClass="entr" presetSubtype="4" fill="hold" grpId="0" nodeType="clickEffect">
+                                  <p:stCondLst>
+                                    <p:cond delay="0"/>
+                                  </p:stCondLst>
+                                  <p:childTnLst>
+                                    <p:set>
+                                      <p:cBhvr>
+                                        <p:cTn id="30" dur="1" fill="hold">
+                                          <p:stCondLst>
+                                            <p:cond delay="0"/>
+                                          </p:stCondLst>
+                                        </p:cTn>
+                                        <p:tgtEl>
+                                          <p:spTgt spid="3">
+                                            <p:txEl>
+                                              <p:pRg st="3" end="3"/>
+                                            </p:txEl>
+                                          </p:spTgt>
+                                        </p:tgtEl>
+                                        <p:attrNameLst>
+                                          <p:attrName>style.visibility</p:attrName>
+                                        </p:attrNameLst>
+                                      </p:cBhvr>
+                                      <p:to>
+                                        <p:strVal val="visible"/>
+                                      </p:to>
+                                    </p:set>
+                                    <p:anim calcmode="lin" valueType="num">
+                                      <p:cBhvr additive="base">
+                                        <p:cTn id="31" dur="500" fill="hold"/>
+                                        <p:tgtEl>
+                                          <p:spTgt spid="3">
+                                            <p:txEl>
+                                              <p:pRg st="3" end="3"/>
+                                            </p:txEl>
+                                          </p:spTgt>
+                                        </p:tgtEl>
+                                        <p:attrNameLst>
+                                          <p:attrName>ppt_x</p:attrName>
+                                        </p:attrNameLst>
+                                      </p:cBhvr>
+                                      <p:tavLst>
+                                        <p:tav tm="0">
+                                          <p:val>
+                                            <p:strVal val="#ppt_x"/>
+                                          </p:val>
+                                        </p:tav>
+                                        <p:tav tm="100000">
+                                          <p:val>
+                                            <p:strVal val="#ppt_x"/>
+                                          </p:val>
+                                        </p:tav>
+                                      </p:tavLst>
+                                    </p:anim>
+                                    <p:anim calcmode="lin" valueType="num">
+                                      <p:cBhvr additive="base">
+                                        <p:cTn id="32" dur="500" fill="hold"/>
+                                        <p:tgtEl>
+                                          <p:spTgt spid="3">
+                                            <p:txEl>
+                                              <p:pRg st="3" end="3"/>
+                                            </p:txEl>
+                                          </p:spTgt>
+                                        </p:tgtEl>
+                                        <p:attrNameLst>
+                                          <p:attrName>ppt_y</p:attrName>
+                                        </p:attrNameLst>
+                                      </p:cBhvr>
+                                      <p:tavLst>
+                                        <p:tav tm="0">
+                                          <p:val>
+                                            <p:strVal val="1+#ppt_h/2"/>
+                                          </p:val>
+                                        </p:tav>
+                                        <p:tav tm="100000">
+                                          <p:val>
+                                            <p:strVal val="#ppt_y"/>
+                                          </p:val>
+                                        </p:tav>
+                                      </p:tavLst>
+                                    </p:anim>
+                                  </p:childTnLst>
+                                </p:cTn>
+                              </p:par>
+                            </p:childTnLst>
+                          </p:cTn>
+                        </p:par>
+                      </p:childTnLst>
+                    </p:cTn>
+                  </p:par>
+                  <p:par>
+                    <p:cTn id="33" fill="hold">
+                      <p:stCondLst>
+                        <p:cond delay="indefinite"/>
+                      </p:stCondLst>
+                      <p:childTnLst>
+                        <p:par>
+                          <p:cTn id="34" fill="hold">
+                            <p:stCondLst>
+                              <p:cond delay="0"/>
+                            </p:stCondLst>
+                            <p:childTnLst>
+                              <p:par>
+                                <p:cTn id="35" presetID="2" presetClass="entr" presetSubtype="4" fill="hold" grpId="0" nodeType="clickEffect">
+                                  <p:stCondLst>
+                                    <p:cond delay="0"/>
+                                  </p:stCondLst>
+                                  <p:childTnLst>
+                                    <p:set>
+                                      <p:cBhvr>
+                                        <p:cTn id="36" dur="1" fill="hold">
+                                          <p:stCondLst>
+                                            <p:cond delay="0"/>
+                                          </p:stCondLst>
+                                        </p:cTn>
+                                        <p:tgtEl>
+                                          <p:spTgt spid="3">
+                                            <p:txEl>
+                                              <p:pRg st="4" end="4"/>
+                                            </p:txEl>
+                                          </p:spTgt>
+                                        </p:tgtEl>
+                                        <p:attrNameLst>
+                                          <p:attrName>style.visibility</p:attrName>
+                                        </p:attrNameLst>
+                                      </p:cBhvr>
+                                      <p:to>
+                                        <p:strVal val="visible"/>
+                                      </p:to>
+                                    </p:set>
+                                    <p:anim calcmode="lin" valueType="num">
+                                      <p:cBhvr additive="base">
+                                        <p:cTn id="37" dur="500" fill="hold"/>
+                                        <p:tgtEl>
+                                          <p:spTgt spid="3">
+                                            <p:txEl>
+                                              <p:pRg st="4" end="4"/>
+                                            </p:txEl>
+                                          </p:spTgt>
+                                        </p:tgtEl>
+                                        <p:attrNameLst>
+                                          <p:attrName>ppt_x</p:attrName>
+                                        </p:attrNameLst>
+                                      </p:cBhvr>
+                                      <p:tavLst>
+                                        <p:tav tm="0">
+                                          <p:val>
+                                            <p:strVal val="#ppt_x"/>
+                                          </p:val>
+                                        </p:tav>
+                                        <p:tav tm="100000">
+                                          <p:val>
+                                            <p:strVal val="#ppt_x"/>
+                                          </p:val>
+                                        </p:tav>
+                                      </p:tavLst>
+                                    </p:anim>
+                                    <p:anim calcmode="lin" valueType="num">
+                                      <p:cBhvr additive="base">
+                                        <p:cTn id="38" dur="500" fill="hold"/>
+                                        <p:tgtEl>
+                                          <p:spTgt spid="3">
+                                            <p:txEl>
+                                              <p:pRg st="4" end="4"/>
+                                            </p:txEl>
+                                          </p:spTgt>
+                                        </p:tgtEl>
+                                        <p:attrNameLst>
+                                          <p:attrName>ppt_y</p:attrName>
+                                        </p:attrNameLst>
+                                      </p:cBhvr>
+                                      <p:tavLst>
+                                        <p:tav tm="0">
+                                          <p:val>
+                                            <p:strVal val="1+#ppt_h/2"/>
+                                          </p:val>
+                                        </p:tav>
+                                        <p:tav tm="100000">
+                                          <p:val>
+                                            <p:strVal val="#ppt_y"/>
+                                          </p:val>
+                                        </p:tav>
+                                      </p:tavLst>
+                                    </p:anim>
+                                  </p:childTnLst>
+                                </p:cTn>
+                              </p:par>
+                            </p:childTnLst>
+                          </p:cTn>
+                        </p:par>
+                      </p:childTnLst>
+                    </p:cTn>
+                  </p:par>
+                  <p:par>
+                    <p:cTn id="39" fill="hold">
+                      <p:stCondLst>
+                        <p:cond delay="indefinite"/>
+                      </p:stCondLst>
+                      <p:childTnLst>
+                        <p:par>
+                          <p:cTn id="40" fill="hold">
+                            <p:stCondLst>
+                              <p:cond delay="0"/>
+                            </p:stCondLst>
+                            <p:childTnLst>
+                              <p:par>
+                                <p:cTn id="41" presetID="42" presetClass="entr" presetSubtype="0" fill="hold" nodeType="clickEffect">
+                                  <p:stCondLst>
+                                    <p:cond delay="0"/>
+                                  </p:stCondLst>
+                                  <p:childTnLst>
+                                    <p:set>
+                                      <p:cBhvr>
+                                        <p:cTn id="42" dur="1" fill="hold">
+                                          <p:stCondLst>
+                                            <p:cond delay="0"/>
+                                          </p:stCondLst>
+                                        </p:cTn>
+                                        <p:tgtEl>
+                                          <p:spTgt spid="2"/>
+                                        </p:tgtEl>
+                                        <p:attrNameLst>
+                                          <p:attrName>style.visibility</p:attrName>
+                                        </p:attrNameLst>
+                                      </p:cBhvr>
+                                      <p:to>
+                                        <p:strVal val="visible"/>
+                                      </p:to>
+                                    </p:set>
+                                    <p:animEffect transition="in" filter="fade">
+                                      <p:cBhvr>
+                                        <p:cTn id="43" dur="1000"/>
+                                        <p:tgtEl>
+                                          <p:spTgt spid="2"/>
+                                        </p:tgtEl>
+                                      </p:cBhvr>
+                                    </p:animEffect>
+                                    <p:anim calcmode="lin" valueType="num">
+                                      <p:cBhvr>
+                                        <p:cTn id="44" dur="1000" fill="hold"/>
+                                        <p:tgtEl>
+                                          <p:spTgt spid="2"/>
+                                        </p:tgtEl>
+                                        <p:attrNameLst>
+                                          <p:attrName>ppt_x</p:attrName>
+                                        </p:attrNameLst>
+                                      </p:cBhvr>
+                                      <p:tavLst>
+                                        <p:tav tm="0">
+                                          <p:val>
+                                            <p:strVal val="#ppt_x"/>
+                                          </p:val>
+                                        </p:tav>
+                                        <p:tav tm="100000">
+                                          <p:val>
+                                            <p:strVal val="#ppt_x"/>
+                                          </p:val>
+                                        </p:tav>
+                                      </p:tavLst>
+                                    </p:anim>
+                                    <p:anim calcmode="lin" valueType="num">
+                                      <p:cBhvr>
+                                        <p:cTn id="45" dur="1000" fill="hold"/>
+                                        <p:tgtEl>
+                                          <p:spTgt spid="2"/>
+                                        </p:tgtEl>
+                                        <p:attrNameLst>
+                                          <p:attrName>ppt_y</p:attrName>
+                                        </p:attrNameLst>
+                                      </p:cBhvr>
+                                      <p:tavLst>
+                                        <p:tav tm="0">
+                                          <p:val>
+                                            <p:strVal val="#ppt_y+.1"/>
+                                          </p:val>
+                                        </p:tav>
+                                        <p:tav tm="100000">
+                                          <p:val>
+                                            <p:strVal val="#ppt_y"/>
+                                          </p:val>
+                                        </p:tav>
+                                      </p:tavLst>
+                                    </p:anim>
+                                  </p:childTnLst>
+                                </p:cTn>
+                              </p:par>
+                            </p:childTnLst>
+                          </p:cTn>
+                        </p:par>
+                      </p:childTnLst>
+                    </p:cTn>
+                  </p:par>
+                </p:childTnLst>
+              </p:cTn>
+              <p:prevCondLst>
+                <p:cond evt="onPrev" delay="0">
+                  <p:tgtEl>
+                    <p:sldTgt/>
+                  </p:tgtEl>
+                </p:cond>
+              </p:prevCondLst>
+              <p:nextCondLst>
+                <p:cond evt="onNext" delay="0">
+                  <p:tgtEl>
+                    <p:sldTgt/>
+                  </p:tgtEl>
+                </p:cond>
+              </p:nextCondLst>
+            </p:seq>
+          </p:childTnLst>
+        </p:cTn>
+      </p:par>
+    </p:tnLst>
+    <p:bldLst>
+      <p:bldP spid="4" grpId="0"/>
+      <p:bldP spid="3" grpId="0" build="p"/>
+    </p:bldLst>
+  </p:timing>
+</p:sld>
+</file>
+
+<file path=ppt/slides/slide11.xml><?xml version="1.0" encoding="utf-8"?>
 <p:sld xmlns:a="http://schemas.openxmlformats.org/drawingml/2006/main" xmlns:r="http://schemas.openxmlformats.org/officeDocument/2006/relationships" xmlns:p="http://schemas.openxmlformats.org/presentationml/2006/main">
   <p:cSld>
     <p:spTree>
@@ -14708,7 +15641,7 @@
 </p:sld>
 </file>
 
-<file path=ppt/slides/slide11.xml><?xml version="1.0" encoding="utf-8"?>
+<file path=ppt/slides/slide12.xml><?xml version="1.0" encoding="utf-8"?>
 <p:sld xmlns:a="http://schemas.openxmlformats.org/drawingml/2006/main" xmlns:r="http://schemas.openxmlformats.org/officeDocument/2006/relationships" xmlns:p="http://schemas.openxmlformats.org/presentationml/2006/main">
   <p:cSld>
     <p:spTree>
@@ -15321,7 +16254,7 @@
 </p:sld>
 </file>
 
-<file path=ppt/slides/slide12.xml><?xml version="1.0" encoding="utf-8"?>
+<file path=ppt/slides/slide13.xml><?xml version="1.0" encoding="utf-8"?>
 <p:sld xmlns:a="http://schemas.openxmlformats.org/drawingml/2006/main" xmlns:r="http://schemas.openxmlformats.org/officeDocument/2006/relationships" xmlns:p="http://schemas.openxmlformats.org/presentationml/2006/main">
   <p:cSld>
     <p:spTree>
@@ -16242,7 +17175,7 @@
 </p:sld>
 </file>
 
-<file path=ppt/slides/slide13.xml><?xml version="1.0" encoding="utf-8"?>
+<file path=ppt/slides/slide14.xml><?xml version="1.0" encoding="utf-8"?>
 <p:sld xmlns:a="http://schemas.openxmlformats.org/drawingml/2006/main" xmlns:r="http://schemas.openxmlformats.org/officeDocument/2006/relationships" xmlns:p="http://schemas.openxmlformats.org/presentationml/2006/main">
   <p:cSld>
     <p:spTree>
@@ -17406,7 +18339,7 @@
 </p:sld>
 </file>
 
-<file path=ppt/slides/slide14.xml><?xml version="1.0" encoding="utf-8"?>
+<file path=ppt/slides/slide15.xml><?xml version="1.0" encoding="utf-8"?>
 <p:sld xmlns:a="http://schemas.openxmlformats.org/drawingml/2006/main" xmlns:r="http://schemas.openxmlformats.org/officeDocument/2006/relationships" xmlns:p="http://schemas.openxmlformats.org/presentationml/2006/main">
   <p:cSld>
     <p:spTree>
@@ -17498,6 +18431,16 @@
             </a:r>
           </a:p>
           <a:p>
+            <a:pPr lvl="1">
+              <a:buFont typeface="Wingdings" panose="05000000000000000000" pitchFamily="2" charset="2"/>
+              <a:buChar char="§"/>
+            </a:pPr>
+            <a:r>
+              <a:rPr lang="en-IN" dirty="0"/>
+              <a:t>https://www.cyberciti.biz/faq/understanding-etcpasswd-file-format/</a:t>
+            </a:r>
+          </a:p>
+          <a:p>
             <a:r>
               <a:rPr lang="en-IN" dirty="0"/>
               <a:t>Top 50 Linux commands</a:t>
@@ -17508,6 +18451,29 @@
               <a:rPr lang="en-IN" dirty="0"/>
               <a:t>Ubuntu package manager cheat sheet</a:t>
             </a:r>
+          </a:p>
+          <a:p>
+            <a:r>
+              <a:rPr lang="en-IN" dirty="0"/>
+              <a:t>Monolithic </a:t>
+            </a:r>
+            <a:r>
+              <a:rPr lang="en-IN"/>
+              <a:t>vs Microservice - </a:t>
+            </a:r>
+            <a:r>
+              <a:rPr lang="en-IN">
+                <a:hlinkClick r:id="rId2"/>
+              </a:rPr>
+              <a:t>https://www.openlegacy.com/blog/monolithic-application</a:t>
+            </a:r>
+            <a:endParaRPr lang="en-IN"/>
+          </a:p>
+          <a:p>
+            <a:pPr marL="0" indent="0">
+              <a:buNone/>
+            </a:pPr>
+            <a:endParaRPr lang="en-IN" dirty="0"/>
           </a:p>
           <a:p>
             <a:endParaRPr lang="en-IN" dirty="0"/>
@@ -18214,6 +19180,137 @@
 </file>
 
 <file path=ppt/slides/slide4.xml><?xml version="1.0" encoding="utf-8"?>
+<p:sld xmlns:a="http://schemas.openxmlformats.org/drawingml/2006/main" xmlns:r="http://schemas.openxmlformats.org/officeDocument/2006/relationships" xmlns:p="http://schemas.openxmlformats.org/presentationml/2006/main">
+  <p:cSld>
+    <p:spTree>
+      <p:nvGrpSpPr>
+        <p:cNvPr id="1" name=""/>
+        <p:cNvGrpSpPr/>
+        <p:nvPr/>
+      </p:nvGrpSpPr>
+      <p:grpSpPr>
+        <a:xfrm>
+          <a:off x="0" y="0"/>
+          <a:ext cx="0" cy="0"/>
+          <a:chOff x="0" y="0"/>
+          <a:chExt cx="0" cy="0"/>
+        </a:xfrm>
+      </p:grpSpPr>
+      <p:sp>
+        <p:nvSpPr>
+          <p:cNvPr id="2" name="Title 1">
+            <a:extLst>
+              <a:ext uri="{FF2B5EF4-FFF2-40B4-BE49-F238E27FC236}">
+                <a16:creationId xmlns:a16="http://schemas.microsoft.com/office/drawing/2014/main" id="{71EDC049-2F3D-556E-A287-758B7FBC5BF4}"/>
+              </a:ext>
+            </a:extLst>
+          </p:cNvPr>
+          <p:cNvSpPr>
+            <a:spLocks noGrp="1"/>
+          </p:cNvSpPr>
+          <p:nvPr>
+            <p:ph type="title"/>
+          </p:nvPr>
+        </p:nvSpPr>
+        <p:spPr/>
+        <p:txBody>
+          <a:bodyPr/>
+          <a:lstStyle/>
+          <a:p>
+            <a:r>
+              <a:rPr lang="en-US" dirty="0"/>
+              <a:t>APPLICATION ARCHITECTURE</a:t>
+            </a:r>
+            <a:endParaRPr lang="en-IN" dirty="0"/>
+          </a:p>
+        </p:txBody>
+      </p:sp>
+      <p:pic>
+        <p:nvPicPr>
+          <p:cNvPr id="5" name="Picture 4">
+            <a:extLst>
+              <a:ext uri="{FF2B5EF4-FFF2-40B4-BE49-F238E27FC236}">
+                <a16:creationId xmlns:a16="http://schemas.microsoft.com/office/drawing/2014/main" id="{A35DECC4-DA96-D816-2ABF-D7EE773A1EB4}"/>
+              </a:ext>
+            </a:extLst>
+          </p:cNvPr>
+          <p:cNvPicPr>
+            <a:picLocks noChangeAspect="1"/>
+          </p:cNvPicPr>
+          <p:nvPr/>
+        </p:nvPicPr>
+        <p:blipFill>
+          <a:blip r:embed="rId2">
+            <a:extLst>
+              <a:ext uri="{28A0092B-C50C-407E-A947-70E740481C1C}">
+                <a14:useLocalDpi xmlns:a14="http://schemas.microsoft.com/office/drawing/2010/main" val="0"/>
+              </a:ext>
+            </a:extLst>
+          </a:blip>
+          <a:stretch>
+            <a:fillRect/>
+          </a:stretch>
+        </p:blipFill>
+        <p:spPr>
+          <a:xfrm>
+            <a:off x="420365" y="2293034"/>
+            <a:ext cx="5502133" cy="4564966"/>
+          </a:xfrm>
+          <a:prstGeom prst="rect">
+            <a:avLst/>
+          </a:prstGeom>
+        </p:spPr>
+      </p:pic>
+      <p:pic>
+        <p:nvPicPr>
+          <p:cNvPr id="7" name="Picture 6">
+            <a:extLst>
+              <a:ext uri="{FF2B5EF4-FFF2-40B4-BE49-F238E27FC236}">
+                <a16:creationId xmlns:a16="http://schemas.microsoft.com/office/drawing/2014/main" id="{B7761B91-EC67-AD41-EC19-2C854D1C0C7C}"/>
+              </a:ext>
+            </a:extLst>
+          </p:cNvPr>
+          <p:cNvPicPr>
+            <a:picLocks noChangeAspect="1"/>
+          </p:cNvPicPr>
+          <p:nvPr/>
+        </p:nvPicPr>
+        <p:blipFill>
+          <a:blip r:embed="rId3">
+            <a:extLst>
+              <a:ext uri="{28A0092B-C50C-407E-A947-70E740481C1C}">
+                <a14:useLocalDpi xmlns:a14="http://schemas.microsoft.com/office/drawing/2010/main" val="0"/>
+              </a:ext>
+            </a:extLst>
+          </a:blip>
+          <a:stretch>
+            <a:fillRect/>
+          </a:stretch>
+        </p:blipFill>
+        <p:spPr>
+          <a:xfrm>
+            <a:off x="6096000" y="2349304"/>
+            <a:ext cx="5783751" cy="4389121"/>
+          </a:xfrm>
+          <a:prstGeom prst="rect">
+            <a:avLst/>
+          </a:prstGeom>
+        </p:spPr>
+      </p:pic>
+    </p:spTree>
+    <p:extLst>
+      <p:ext uri="{BB962C8B-B14F-4D97-AF65-F5344CB8AC3E}">
+        <p14:creationId xmlns:p14="http://schemas.microsoft.com/office/powerpoint/2010/main" val="1043434064"/>
+      </p:ext>
+    </p:extLst>
+  </p:cSld>
+  <p:clrMapOvr>
+    <a:masterClrMapping/>
+  </p:clrMapOvr>
+</p:sld>
+</file>
+
+<file path=ppt/slides/slide5.xml><?xml version="1.0" encoding="utf-8"?>
 <p:sld xmlns:a="http://schemas.openxmlformats.org/drawingml/2006/main" xmlns:r="http://schemas.openxmlformats.org/officeDocument/2006/relationships" xmlns:p="http://schemas.openxmlformats.org/presentationml/2006/main">
   <p:cSld>
     <p:spTree>
@@ -18873,7 +19970,7 @@
 </p:sld>
 </file>
 
-<file path=ppt/slides/slide5.xml><?xml version="1.0" encoding="utf-8"?>
+<file path=ppt/slides/slide6.xml><?xml version="1.0" encoding="utf-8"?>
 <p:sld xmlns:a="http://schemas.openxmlformats.org/drawingml/2006/main" xmlns:r="http://schemas.openxmlformats.org/officeDocument/2006/relationships" xmlns:p="http://schemas.openxmlformats.org/presentationml/2006/main">
   <p:cSld>
     <p:spTree>
@@ -19119,7 +20216,7 @@
 </p:sld>
 </file>
 
-<file path=ppt/slides/slide6.xml><?xml version="1.0" encoding="utf-8"?>
+<file path=ppt/slides/slide7.xml><?xml version="1.0" encoding="utf-8"?>
 <p:sld xmlns:a="http://schemas.openxmlformats.org/drawingml/2006/main" xmlns:r="http://schemas.openxmlformats.org/officeDocument/2006/relationships" xmlns:p="http://schemas.openxmlformats.org/presentationml/2006/main">
   <p:cSld>
     <p:spTree>
@@ -19481,7 +20578,7 @@
 </p:sld>
 </file>
 
-<file path=ppt/slides/slide7.xml><?xml version="1.0" encoding="utf-8"?>
+<file path=ppt/slides/slide8.xml><?xml version="1.0" encoding="utf-8"?>
 <p:sld xmlns:a="http://schemas.openxmlformats.org/drawingml/2006/main" xmlns:r="http://schemas.openxmlformats.org/officeDocument/2006/relationships" xmlns:p="http://schemas.openxmlformats.org/presentationml/2006/main">
   <p:cSld>
     <p:spTree>
@@ -20514,7 +21611,7 @@
 </p:sld>
 </file>
 
-<file path=ppt/slides/slide8.xml><?xml version="1.0" encoding="utf-8"?>
+<file path=ppt/slides/slide9.xml><?xml version="1.0" encoding="utf-8"?>
 <p:sld xmlns:a="http://schemas.openxmlformats.org/drawingml/2006/main" xmlns:r="http://schemas.openxmlformats.org/officeDocument/2006/relationships" xmlns:p="http://schemas.openxmlformats.org/presentationml/2006/main">
   <p:cSld>
     <p:spTree>
@@ -21430,938 +22527,6 @@
 </p:sld>
 </file>
 
-<file path=ppt/slides/slide9.xml><?xml version="1.0" encoding="utf-8"?>
-<p:sld xmlns:a="http://schemas.openxmlformats.org/drawingml/2006/main" xmlns:r="http://schemas.openxmlformats.org/officeDocument/2006/relationships" xmlns:p="http://schemas.openxmlformats.org/presentationml/2006/main">
-  <p:cSld>
-    <p:spTree>
-      <p:nvGrpSpPr>
-        <p:cNvPr id="1" name=""/>
-        <p:cNvGrpSpPr/>
-        <p:nvPr/>
-      </p:nvGrpSpPr>
-      <p:grpSpPr>
-        <a:xfrm>
-          <a:off x="0" y="0"/>
-          <a:ext cx="0" cy="0"/>
-          <a:chOff x="0" y="0"/>
-          <a:chExt cx="0" cy="0"/>
-        </a:xfrm>
-      </p:grpSpPr>
-      <p:sp>
-        <p:nvSpPr>
-          <p:cNvPr id="4" name="Title 1">
-            <a:extLst>
-              <a:ext uri="{FF2B5EF4-FFF2-40B4-BE49-F238E27FC236}">
-                <a16:creationId xmlns:a16="http://schemas.microsoft.com/office/drawing/2014/main" id="{84823479-A31A-9A25-B7F5-EFCABE23D8F6}"/>
-              </a:ext>
-            </a:extLst>
-          </p:cNvPr>
-          <p:cNvSpPr>
-            <a:spLocks noGrp="1"/>
-          </p:cNvSpPr>
-          <p:nvPr>
-            <p:ph type="title"/>
-          </p:nvPr>
-        </p:nvSpPr>
-        <p:spPr>
-          <a:xfrm>
-            <a:off x="832976" y="929923"/>
-            <a:ext cx="8761413" cy="706964"/>
-          </a:xfrm>
-        </p:spPr>
-        <p:txBody>
-          <a:bodyPr>
-            <a:normAutofit/>
-          </a:bodyPr>
-          <a:lstStyle/>
-          <a:p>
-            <a:r>
-              <a:rPr lang="en-US" dirty="0"/>
-              <a:t>DOCKER CONTAINER</a:t>
-            </a:r>
-            <a:endParaRPr lang="en-IN" dirty="0"/>
-          </a:p>
-        </p:txBody>
-      </p:sp>
-      <p:sp>
-        <p:nvSpPr>
-          <p:cNvPr id="3" name="Content Placeholder 2"/>
-          <p:cNvSpPr>
-            <a:spLocks noGrp="1"/>
-          </p:cNvSpPr>
-          <p:nvPr>
-            <p:ph idx="1"/>
-          </p:nvPr>
-        </p:nvSpPr>
-        <p:spPr>
-          <a:xfrm>
-            <a:off x="395118" y="2278499"/>
-            <a:ext cx="10017361" cy="3836697"/>
-          </a:xfrm>
-        </p:spPr>
-        <p:txBody>
-          <a:bodyPr anchor="t"/>
-          <a:lstStyle/>
-          <a:p>
-            <a:r>
-              <a:rPr lang="en-US" dirty="0">
-                <a:solidFill>
-                  <a:srgbClr val="31859C"/>
-                </a:solidFill>
-              </a:rPr>
-              <a:t>Isolated application platform</a:t>
-            </a:r>
-          </a:p>
-          <a:p>
-            <a:r>
-              <a:rPr lang="en-US" dirty="0">
-                <a:solidFill>
-                  <a:srgbClr val="31859C"/>
-                </a:solidFill>
-              </a:rPr>
-              <a:t>Containers everything needed to run you application</a:t>
-            </a:r>
-          </a:p>
-          <a:p>
-            <a:r>
-              <a:rPr lang="en-US" dirty="0">
-                <a:solidFill>
-                  <a:srgbClr val="31859C"/>
-                </a:solidFill>
-              </a:rPr>
-              <a:t>Based on one or more images</a:t>
-            </a:r>
-          </a:p>
-          <a:p>
-            <a:r>
-              <a:rPr lang="en-US" dirty="0">
-                <a:solidFill>
-                  <a:srgbClr val="31859C"/>
-                </a:solidFill>
-              </a:rPr>
-              <a:t>Docker containers launched from Docker image</a:t>
-            </a:r>
-          </a:p>
-          <a:p>
-            <a:r>
-              <a:rPr lang="en-US" dirty="0">
-                <a:solidFill>
-                  <a:srgbClr val="31859C"/>
-                </a:solidFill>
-              </a:rPr>
-              <a:t>When Docker container runs, it adds a read-write layer on top of the image</a:t>
-            </a:r>
-          </a:p>
-        </p:txBody>
-      </p:sp>
-      <p:pic>
-        <p:nvPicPr>
-          <p:cNvPr id="2" name="Picture 1"/>
-          <p:cNvPicPr>
-            <a:picLocks noChangeAspect="1"/>
-          </p:cNvPicPr>
-          <p:nvPr/>
-        </p:nvPicPr>
-        <p:blipFill>
-          <a:blip r:embed="rId2">
-            <a:alphaModFix/>
-            <a:extLst>
-              <a:ext uri="{28A0092B-C50C-407E-A947-70E740481C1C}">
-                <a14:useLocalDpi xmlns:a14="http://schemas.microsoft.com/office/drawing/2010/main" val="0"/>
-              </a:ext>
-            </a:extLst>
-          </a:blip>
-          <a:stretch>
-            <a:fillRect/>
-          </a:stretch>
-        </p:blipFill>
-        <p:spPr>
-          <a:xfrm>
-            <a:off x="4796590" y="4405395"/>
-            <a:ext cx="6976980" cy="2277353"/>
-          </a:xfrm>
-          <a:prstGeom prst="rect">
-            <a:avLst/>
-          </a:prstGeom>
-          <a:noFill/>
-          <a:ln>
-            <a:solidFill>
-              <a:schemeClr val="tx1"/>
-            </a:solidFill>
-          </a:ln>
-          <a:effectLst>
-            <a:outerShdw blurRad="63500" sx="102000" sy="102000" algn="ctr" rotWithShape="0">
-              <a:prstClr val="black">
-                <a:alpha val="40000"/>
-              </a:prstClr>
-            </a:outerShdw>
-          </a:effectLst>
-        </p:spPr>
-      </p:pic>
-    </p:spTree>
-    <p:extLst>
-      <p:ext uri="{BB962C8B-B14F-4D97-AF65-F5344CB8AC3E}">
-        <p14:creationId xmlns:p14="http://schemas.microsoft.com/office/powerpoint/2010/main" val="1136863945"/>
-      </p:ext>
-    </p:extLst>
-  </p:cSld>
-  <p:clrMapOvr>
-    <a:masterClrMapping/>
-  </p:clrMapOvr>
-  <mc:AlternateContent xmlns:mc="http://schemas.openxmlformats.org/markup-compatibility/2006" xmlns:p14="http://schemas.microsoft.com/office/powerpoint/2010/main">
-    <mc:Choice Requires="p14">
-      <p:transition spd="med" p14:dur="700">
-        <p:fade/>
-      </p:transition>
-    </mc:Choice>
-    <mc:Fallback xmlns="">
-      <p:transition spd="med">
-        <p:fade/>
-      </p:transition>
-    </mc:Fallback>
-  </mc:AlternateContent>
-  <p:timing>
-    <p:tnLst>
-      <p:par>
-        <p:cTn id="1" dur="indefinite" restart="never" nodeType="tmRoot">
-          <p:childTnLst>
-            <p:seq concurrent="1" nextAc="seek">
-              <p:cTn id="2" dur="indefinite" nodeType="mainSeq">
-                <p:childTnLst>
-                  <p:par>
-                    <p:cTn id="3" fill="hold">
-                      <p:stCondLst>
-                        <p:cond delay="indefinite"/>
-                      </p:stCondLst>
-                      <p:childTnLst>
-                        <p:par>
-                          <p:cTn id="4" fill="hold">
-                            <p:stCondLst>
-                              <p:cond delay="0"/>
-                            </p:stCondLst>
-                            <p:childTnLst>
-                              <p:par>
-                                <p:cTn id="5" presetID="2" presetClass="entr" presetSubtype="4" fill="hold" grpId="0" nodeType="clickEffect">
-                                  <p:stCondLst>
-                                    <p:cond delay="0"/>
-                                  </p:stCondLst>
-                                  <p:childTnLst>
-                                    <p:set>
-                                      <p:cBhvr>
-                                        <p:cTn id="6" dur="1" fill="hold">
-                                          <p:stCondLst>
-                                            <p:cond delay="0"/>
-                                          </p:stCondLst>
-                                        </p:cTn>
-                                        <p:tgtEl>
-                                          <p:spTgt spid="4"/>
-                                        </p:tgtEl>
-                                        <p:attrNameLst>
-                                          <p:attrName>style.visibility</p:attrName>
-                                        </p:attrNameLst>
-                                      </p:cBhvr>
-                                      <p:to>
-                                        <p:strVal val="visible"/>
-                                      </p:to>
-                                    </p:set>
-                                    <p:anim calcmode="lin" valueType="num">
-                                      <p:cBhvr additive="base">
-                                        <p:cTn id="7" dur="500" fill="hold"/>
-                                        <p:tgtEl>
-                                          <p:spTgt spid="4"/>
-                                        </p:tgtEl>
-                                        <p:attrNameLst>
-                                          <p:attrName>ppt_x</p:attrName>
-                                        </p:attrNameLst>
-                                      </p:cBhvr>
-                                      <p:tavLst>
-                                        <p:tav tm="0">
-                                          <p:val>
-                                            <p:strVal val="#ppt_x"/>
-                                          </p:val>
-                                        </p:tav>
-                                        <p:tav tm="100000">
-                                          <p:val>
-                                            <p:strVal val="#ppt_x"/>
-                                          </p:val>
-                                        </p:tav>
-                                      </p:tavLst>
-                                    </p:anim>
-                                    <p:anim calcmode="lin" valueType="num">
-                                      <p:cBhvr additive="base">
-                                        <p:cTn id="8" dur="500" fill="hold"/>
-                                        <p:tgtEl>
-                                          <p:spTgt spid="4"/>
-                                        </p:tgtEl>
-                                        <p:attrNameLst>
-                                          <p:attrName>ppt_y</p:attrName>
-                                        </p:attrNameLst>
-                                      </p:cBhvr>
-                                      <p:tavLst>
-                                        <p:tav tm="0">
-                                          <p:val>
-                                            <p:strVal val="1+#ppt_h/2"/>
-                                          </p:val>
-                                        </p:tav>
-                                        <p:tav tm="100000">
-                                          <p:val>
-                                            <p:strVal val="#ppt_y"/>
-                                          </p:val>
-                                        </p:tav>
-                                      </p:tavLst>
-                                    </p:anim>
-                                  </p:childTnLst>
-                                </p:cTn>
-                              </p:par>
-                            </p:childTnLst>
-                          </p:cTn>
-                        </p:par>
-                      </p:childTnLst>
-                    </p:cTn>
-                  </p:par>
-                  <p:par>
-                    <p:cTn id="9" fill="hold">
-                      <p:stCondLst>
-                        <p:cond delay="indefinite"/>
-                      </p:stCondLst>
-                      <p:childTnLst>
-                        <p:par>
-                          <p:cTn id="10" fill="hold">
-                            <p:stCondLst>
-                              <p:cond delay="0"/>
-                            </p:stCondLst>
-                            <p:childTnLst>
-                              <p:par>
-                                <p:cTn id="11" presetID="2" presetClass="entr" presetSubtype="4" fill="hold" grpId="0" nodeType="clickEffect">
-                                  <p:stCondLst>
-                                    <p:cond delay="0"/>
-                                  </p:stCondLst>
-                                  <p:childTnLst>
-                                    <p:set>
-                                      <p:cBhvr>
-                                        <p:cTn id="12" dur="1" fill="hold">
-                                          <p:stCondLst>
-                                            <p:cond delay="0"/>
-                                          </p:stCondLst>
-                                        </p:cTn>
-                                        <p:tgtEl>
-                                          <p:spTgt spid="3">
-                                            <p:txEl>
-                                              <p:pRg st="0" end="0"/>
-                                            </p:txEl>
-                                          </p:spTgt>
-                                        </p:tgtEl>
-                                        <p:attrNameLst>
-                                          <p:attrName>style.visibility</p:attrName>
-                                        </p:attrNameLst>
-                                      </p:cBhvr>
-                                      <p:to>
-                                        <p:strVal val="visible"/>
-                                      </p:to>
-                                    </p:set>
-                                    <p:anim calcmode="lin" valueType="num">
-                                      <p:cBhvr additive="base">
-                                        <p:cTn id="13" dur="500" fill="hold"/>
-                                        <p:tgtEl>
-                                          <p:spTgt spid="3">
-                                            <p:txEl>
-                                              <p:pRg st="0" end="0"/>
-                                            </p:txEl>
-                                          </p:spTgt>
-                                        </p:tgtEl>
-                                        <p:attrNameLst>
-                                          <p:attrName>ppt_x</p:attrName>
-                                        </p:attrNameLst>
-                                      </p:cBhvr>
-                                      <p:tavLst>
-                                        <p:tav tm="0">
-                                          <p:val>
-                                            <p:strVal val="#ppt_x"/>
-                                          </p:val>
-                                        </p:tav>
-                                        <p:tav tm="100000">
-                                          <p:val>
-                                            <p:strVal val="#ppt_x"/>
-                                          </p:val>
-                                        </p:tav>
-                                      </p:tavLst>
-                                    </p:anim>
-                                    <p:anim calcmode="lin" valueType="num">
-                                      <p:cBhvr additive="base">
-                                        <p:cTn id="14" dur="500" fill="hold"/>
-                                        <p:tgtEl>
-                                          <p:spTgt spid="3">
-                                            <p:txEl>
-                                              <p:pRg st="0" end="0"/>
-                                            </p:txEl>
-                                          </p:spTgt>
-                                        </p:tgtEl>
-                                        <p:attrNameLst>
-                                          <p:attrName>ppt_y</p:attrName>
-                                        </p:attrNameLst>
-                                      </p:cBhvr>
-                                      <p:tavLst>
-                                        <p:tav tm="0">
-                                          <p:val>
-                                            <p:strVal val="1+#ppt_h/2"/>
-                                          </p:val>
-                                        </p:tav>
-                                        <p:tav tm="100000">
-                                          <p:val>
-                                            <p:strVal val="#ppt_y"/>
-                                          </p:val>
-                                        </p:tav>
-                                      </p:tavLst>
-                                    </p:anim>
-                                  </p:childTnLst>
-                                </p:cTn>
-                              </p:par>
-                            </p:childTnLst>
-                          </p:cTn>
-                        </p:par>
-                      </p:childTnLst>
-                    </p:cTn>
-                  </p:par>
-                  <p:par>
-                    <p:cTn id="15" fill="hold">
-                      <p:stCondLst>
-                        <p:cond delay="indefinite"/>
-                      </p:stCondLst>
-                      <p:childTnLst>
-                        <p:par>
-                          <p:cTn id="16" fill="hold">
-                            <p:stCondLst>
-                              <p:cond delay="0"/>
-                            </p:stCondLst>
-                            <p:childTnLst>
-                              <p:par>
-                                <p:cTn id="17" presetID="2" presetClass="entr" presetSubtype="4" fill="hold" grpId="0" nodeType="clickEffect">
-                                  <p:stCondLst>
-                                    <p:cond delay="0"/>
-                                  </p:stCondLst>
-                                  <p:childTnLst>
-                                    <p:set>
-                                      <p:cBhvr>
-                                        <p:cTn id="18" dur="1" fill="hold">
-                                          <p:stCondLst>
-                                            <p:cond delay="0"/>
-                                          </p:stCondLst>
-                                        </p:cTn>
-                                        <p:tgtEl>
-                                          <p:spTgt spid="3">
-                                            <p:txEl>
-                                              <p:pRg st="1" end="1"/>
-                                            </p:txEl>
-                                          </p:spTgt>
-                                        </p:tgtEl>
-                                        <p:attrNameLst>
-                                          <p:attrName>style.visibility</p:attrName>
-                                        </p:attrNameLst>
-                                      </p:cBhvr>
-                                      <p:to>
-                                        <p:strVal val="visible"/>
-                                      </p:to>
-                                    </p:set>
-                                    <p:anim calcmode="lin" valueType="num">
-                                      <p:cBhvr additive="base">
-                                        <p:cTn id="19" dur="500" fill="hold"/>
-                                        <p:tgtEl>
-                                          <p:spTgt spid="3">
-                                            <p:txEl>
-                                              <p:pRg st="1" end="1"/>
-                                            </p:txEl>
-                                          </p:spTgt>
-                                        </p:tgtEl>
-                                        <p:attrNameLst>
-                                          <p:attrName>ppt_x</p:attrName>
-                                        </p:attrNameLst>
-                                      </p:cBhvr>
-                                      <p:tavLst>
-                                        <p:tav tm="0">
-                                          <p:val>
-                                            <p:strVal val="#ppt_x"/>
-                                          </p:val>
-                                        </p:tav>
-                                        <p:tav tm="100000">
-                                          <p:val>
-                                            <p:strVal val="#ppt_x"/>
-                                          </p:val>
-                                        </p:tav>
-                                      </p:tavLst>
-                                    </p:anim>
-                                    <p:anim calcmode="lin" valueType="num">
-                                      <p:cBhvr additive="base">
-                                        <p:cTn id="20" dur="500" fill="hold"/>
-                                        <p:tgtEl>
-                                          <p:spTgt spid="3">
-                                            <p:txEl>
-                                              <p:pRg st="1" end="1"/>
-                                            </p:txEl>
-                                          </p:spTgt>
-                                        </p:tgtEl>
-                                        <p:attrNameLst>
-                                          <p:attrName>ppt_y</p:attrName>
-                                        </p:attrNameLst>
-                                      </p:cBhvr>
-                                      <p:tavLst>
-                                        <p:tav tm="0">
-                                          <p:val>
-                                            <p:strVal val="1+#ppt_h/2"/>
-                                          </p:val>
-                                        </p:tav>
-                                        <p:tav tm="100000">
-                                          <p:val>
-                                            <p:strVal val="#ppt_y"/>
-                                          </p:val>
-                                        </p:tav>
-                                      </p:tavLst>
-                                    </p:anim>
-                                  </p:childTnLst>
-                                </p:cTn>
-                              </p:par>
-                            </p:childTnLst>
-                          </p:cTn>
-                        </p:par>
-                      </p:childTnLst>
-                    </p:cTn>
-                  </p:par>
-                  <p:par>
-                    <p:cTn id="21" fill="hold">
-                      <p:stCondLst>
-                        <p:cond delay="indefinite"/>
-                      </p:stCondLst>
-                      <p:childTnLst>
-                        <p:par>
-                          <p:cTn id="22" fill="hold">
-                            <p:stCondLst>
-                              <p:cond delay="0"/>
-                            </p:stCondLst>
-                            <p:childTnLst>
-                              <p:par>
-                                <p:cTn id="23" presetID="2" presetClass="entr" presetSubtype="4" fill="hold" grpId="0" nodeType="clickEffect">
-                                  <p:stCondLst>
-                                    <p:cond delay="0"/>
-                                  </p:stCondLst>
-                                  <p:childTnLst>
-                                    <p:set>
-                                      <p:cBhvr>
-                                        <p:cTn id="24" dur="1" fill="hold">
-                                          <p:stCondLst>
-                                            <p:cond delay="0"/>
-                                          </p:stCondLst>
-                                        </p:cTn>
-                                        <p:tgtEl>
-                                          <p:spTgt spid="3">
-                                            <p:txEl>
-                                              <p:pRg st="2" end="2"/>
-                                            </p:txEl>
-                                          </p:spTgt>
-                                        </p:tgtEl>
-                                        <p:attrNameLst>
-                                          <p:attrName>style.visibility</p:attrName>
-                                        </p:attrNameLst>
-                                      </p:cBhvr>
-                                      <p:to>
-                                        <p:strVal val="visible"/>
-                                      </p:to>
-                                    </p:set>
-                                    <p:anim calcmode="lin" valueType="num">
-                                      <p:cBhvr additive="base">
-                                        <p:cTn id="25" dur="500" fill="hold"/>
-                                        <p:tgtEl>
-                                          <p:spTgt spid="3">
-                                            <p:txEl>
-                                              <p:pRg st="2" end="2"/>
-                                            </p:txEl>
-                                          </p:spTgt>
-                                        </p:tgtEl>
-                                        <p:attrNameLst>
-                                          <p:attrName>ppt_x</p:attrName>
-                                        </p:attrNameLst>
-                                      </p:cBhvr>
-                                      <p:tavLst>
-                                        <p:tav tm="0">
-                                          <p:val>
-                                            <p:strVal val="#ppt_x"/>
-                                          </p:val>
-                                        </p:tav>
-                                        <p:tav tm="100000">
-                                          <p:val>
-                                            <p:strVal val="#ppt_x"/>
-                                          </p:val>
-                                        </p:tav>
-                                      </p:tavLst>
-                                    </p:anim>
-                                    <p:anim calcmode="lin" valueType="num">
-                                      <p:cBhvr additive="base">
-                                        <p:cTn id="26" dur="500" fill="hold"/>
-                                        <p:tgtEl>
-                                          <p:spTgt spid="3">
-                                            <p:txEl>
-                                              <p:pRg st="2" end="2"/>
-                                            </p:txEl>
-                                          </p:spTgt>
-                                        </p:tgtEl>
-                                        <p:attrNameLst>
-                                          <p:attrName>ppt_y</p:attrName>
-                                        </p:attrNameLst>
-                                      </p:cBhvr>
-                                      <p:tavLst>
-                                        <p:tav tm="0">
-                                          <p:val>
-                                            <p:strVal val="1+#ppt_h/2"/>
-                                          </p:val>
-                                        </p:tav>
-                                        <p:tav tm="100000">
-                                          <p:val>
-                                            <p:strVal val="#ppt_y"/>
-                                          </p:val>
-                                        </p:tav>
-                                      </p:tavLst>
-                                    </p:anim>
-                                  </p:childTnLst>
-                                </p:cTn>
-                              </p:par>
-                            </p:childTnLst>
-                          </p:cTn>
-                        </p:par>
-                      </p:childTnLst>
-                    </p:cTn>
-                  </p:par>
-                  <p:par>
-                    <p:cTn id="27" fill="hold">
-                      <p:stCondLst>
-                        <p:cond delay="indefinite"/>
-                      </p:stCondLst>
-                      <p:childTnLst>
-                        <p:par>
-                          <p:cTn id="28" fill="hold">
-                            <p:stCondLst>
-                              <p:cond delay="0"/>
-                            </p:stCondLst>
-                            <p:childTnLst>
-                              <p:par>
-                                <p:cTn id="29" presetID="2" presetClass="entr" presetSubtype="4" fill="hold" grpId="0" nodeType="clickEffect">
-                                  <p:stCondLst>
-                                    <p:cond delay="0"/>
-                                  </p:stCondLst>
-                                  <p:childTnLst>
-                                    <p:set>
-                                      <p:cBhvr>
-                                        <p:cTn id="30" dur="1" fill="hold">
-                                          <p:stCondLst>
-                                            <p:cond delay="0"/>
-                                          </p:stCondLst>
-                                        </p:cTn>
-                                        <p:tgtEl>
-                                          <p:spTgt spid="3">
-                                            <p:txEl>
-                                              <p:pRg st="3" end="3"/>
-                                            </p:txEl>
-                                          </p:spTgt>
-                                        </p:tgtEl>
-                                        <p:attrNameLst>
-                                          <p:attrName>style.visibility</p:attrName>
-                                        </p:attrNameLst>
-                                      </p:cBhvr>
-                                      <p:to>
-                                        <p:strVal val="visible"/>
-                                      </p:to>
-                                    </p:set>
-                                    <p:anim calcmode="lin" valueType="num">
-                                      <p:cBhvr additive="base">
-                                        <p:cTn id="31" dur="500" fill="hold"/>
-                                        <p:tgtEl>
-                                          <p:spTgt spid="3">
-                                            <p:txEl>
-                                              <p:pRg st="3" end="3"/>
-                                            </p:txEl>
-                                          </p:spTgt>
-                                        </p:tgtEl>
-                                        <p:attrNameLst>
-                                          <p:attrName>ppt_x</p:attrName>
-                                        </p:attrNameLst>
-                                      </p:cBhvr>
-                                      <p:tavLst>
-                                        <p:tav tm="0">
-                                          <p:val>
-                                            <p:strVal val="#ppt_x"/>
-                                          </p:val>
-                                        </p:tav>
-                                        <p:tav tm="100000">
-                                          <p:val>
-                                            <p:strVal val="#ppt_x"/>
-                                          </p:val>
-                                        </p:tav>
-                                      </p:tavLst>
-                                    </p:anim>
-                                    <p:anim calcmode="lin" valueType="num">
-                                      <p:cBhvr additive="base">
-                                        <p:cTn id="32" dur="500" fill="hold"/>
-                                        <p:tgtEl>
-                                          <p:spTgt spid="3">
-                                            <p:txEl>
-                                              <p:pRg st="3" end="3"/>
-                                            </p:txEl>
-                                          </p:spTgt>
-                                        </p:tgtEl>
-                                        <p:attrNameLst>
-                                          <p:attrName>ppt_y</p:attrName>
-                                        </p:attrNameLst>
-                                      </p:cBhvr>
-                                      <p:tavLst>
-                                        <p:tav tm="0">
-                                          <p:val>
-                                            <p:strVal val="1+#ppt_h/2"/>
-                                          </p:val>
-                                        </p:tav>
-                                        <p:tav tm="100000">
-                                          <p:val>
-                                            <p:strVal val="#ppt_y"/>
-                                          </p:val>
-                                        </p:tav>
-                                      </p:tavLst>
-                                    </p:anim>
-                                  </p:childTnLst>
-                                </p:cTn>
-                              </p:par>
-                            </p:childTnLst>
-                          </p:cTn>
-                        </p:par>
-                      </p:childTnLst>
-                    </p:cTn>
-                  </p:par>
-                  <p:par>
-                    <p:cTn id="33" fill="hold">
-                      <p:stCondLst>
-                        <p:cond delay="indefinite"/>
-                      </p:stCondLst>
-                      <p:childTnLst>
-                        <p:par>
-                          <p:cTn id="34" fill="hold">
-                            <p:stCondLst>
-                              <p:cond delay="0"/>
-                            </p:stCondLst>
-                            <p:childTnLst>
-                              <p:par>
-                                <p:cTn id="35" presetID="2" presetClass="entr" presetSubtype="4" fill="hold" grpId="0" nodeType="clickEffect">
-                                  <p:stCondLst>
-                                    <p:cond delay="0"/>
-                                  </p:stCondLst>
-                                  <p:childTnLst>
-                                    <p:set>
-                                      <p:cBhvr>
-                                        <p:cTn id="36" dur="1" fill="hold">
-                                          <p:stCondLst>
-                                            <p:cond delay="0"/>
-                                          </p:stCondLst>
-                                        </p:cTn>
-                                        <p:tgtEl>
-                                          <p:spTgt spid="3">
-                                            <p:txEl>
-                                              <p:pRg st="4" end="4"/>
-                                            </p:txEl>
-                                          </p:spTgt>
-                                        </p:tgtEl>
-                                        <p:attrNameLst>
-                                          <p:attrName>style.visibility</p:attrName>
-                                        </p:attrNameLst>
-                                      </p:cBhvr>
-                                      <p:to>
-                                        <p:strVal val="visible"/>
-                                      </p:to>
-                                    </p:set>
-                                    <p:anim calcmode="lin" valueType="num">
-                                      <p:cBhvr additive="base">
-                                        <p:cTn id="37" dur="500" fill="hold"/>
-                                        <p:tgtEl>
-                                          <p:spTgt spid="3">
-                                            <p:txEl>
-                                              <p:pRg st="4" end="4"/>
-                                            </p:txEl>
-                                          </p:spTgt>
-                                        </p:tgtEl>
-                                        <p:attrNameLst>
-                                          <p:attrName>ppt_x</p:attrName>
-                                        </p:attrNameLst>
-                                      </p:cBhvr>
-                                      <p:tavLst>
-                                        <p:tav tm="0">
-                                          <p:val>
-                                            <p:strVal val="#ppt_x"/>
-                                          </p:val>
-                                        </p:tav>
-                                        <p:tav tm="100000">
-                                          <p:val>
-                                            <p:strVal val="#ppt_x"/>
-                                          </p:val>
-                                        </p:tav>
-                                      </p:tavLst>
-                                    </p:anim>
-                                    <p:anim calcmode="lin" valueType="num">
-                                      <p:cBhvr additive="base">
-                                        <p:cTn id="38" dur="500" fill="hold"/>
-                                        <p:tgtEl>
-                                          <p:spTgt spid="3">
-                                            <p:txEl>
-                                              <p:pRg st="4" end="4"/>
-                                            </p:txEl>
-                                          </p:spTgt>
-                                        </p:tgtEl>
-                                        <p:attrNameLst>
-                                          <p:attrName>ppt_y</p:attrName>
-                                        </p:attrNameLst>
-                                      </p:cBhvr>
-                                      <p:tavLst>
-                                        <p:tav tm="0">
-                                          <p:val>
-                                            <p:strVal val="1+#ppt_h/2"/>
-                                          </p:val>
-                                        </p:tav>
-                                        <p:tav tm="100000">
-                                          <p:val>
-                                            <p:strVal val="#ppt_y"/>
-                                          </p:val>
-                                        </p:tav>
-                                      </p:tavLst>
-                                    </p:anim>
-                                  </p:childTnLst>
-                                </p:cTn>
-                              </p:par>
-                            </p:childTnLst>
-                          </p:cTn>
-                        </p:par>
-                      </p:childTnLst>
-                    </p:cTn>
-                  </p:par>
-                  <p:par>
-                    <p:cTn id="39" fill="hold">
-                      <p:stCondLst>
-                        <p:cond delay="indefinite"/>
-                      </p:stCondLst>
-                      <p:childTnLst>
-                        <p:par>
-                          <p:cTn id="40" fill="hold">
-                            <p:stCondLst>
-                              <p:cond delay="0"/>
-                            </p:stCondLst>
-                            <p:childTnLst>
-                              <p:par>
-                                <p:cTn id="41" presetID="42" presetClass="entr" presetSubtype="0" fill="hold" nodeType="clickEffect">
-                                  <p:stCondLst>
-                                    <p:cond delay="0"/>
-                                  </p:stCondLst>
-                                  <p:childTnLst>
-                                    <p:set>
-                                      <p:cBhvr>
-                                        <p:cTn id="42" dur="1" fill="hold">
-                                          <p:stCondLst>
-                                            <p:cond delay="0"/>
-                                          </p:stCondLst>
-                                        </p:cTn>
-                                        <p:tgtEl>
-                                          <p:spTgt spid="2"/>
-                                        </p:tgtEl>
-                                        <p:attrNameLst>
-                                          <p:attrName>style.visibility</p:attrName>
-                                        </p:attrNameLst>
-                                      </p:cBhvr>
-                                      <p:to>
-                                        <p:strVal val="visible"/>
-                                      </p:to>
-                                    </p:set>
-                                    <p:animEffect transition="in" filter="fade">
-                                      <p:cBhvr>
-                                        <p:cTn id="43" dur="1000"/>
-                                        <p:tgtEl>
-                                          <p:spTgt spid="2"/>
-                                        </p:tgtEl>
-                                      </p:cBhvr>
-                                    </p:animEffect>
-                                    <p:anim calcmode="lin" valueType="num">
-                                      <p:cBhvr>
-                                        <p:cTn id="44" dur="1000" fill="hold"/>
-                                        <p:tgtEl>
-                                          <p:spTgt spid="2"/>
-                                        </p:tgtEl>
-                                        <p:attrNameLst>
-                                          <p:attrName>ppt_x</p:attrName>
-                                        </p:attrNameLst>
-                                      </p:cBhvr>
-                                      <p:tavLst>
-                                        <p:tav tm="0">
-                                          <p:val>
-                                            <p:strVal val="#ppt_x"/>
-                                          </p:val>
-                                        </p:tav>
-                                        <p:tav tm="100000">
-                                          <p:val>
-                                            <p:strVal val="#ppt_x"/>
-                                          </p:val>
-                                        </p:tav>
-                                      </p:tavLst>
-                                    </p:anim>
-                                    <p:anim calcmode="lin" valueType="num">
-                                      <p:cBhvr>
-                                        <p:cTn id="45" dur="1000" fill="hold"/>
-                                        <p:tgtEl>
-                                          <p:spTgt spid="2"/>
-                                        </p:tgtEl>
-                                        <p:attrNameLst>
-                                          <p:attrName>ppt_y</p:attrName>
-                                        </p:attrNameLst>
-                                      </p:cBhvr>
-                                      <p:tavLst>
-                                        <p:tav tm="0">
-                                          <p:val>
-                                            <p:strVal val="#ppt_y+.1"/>
-                                          </p:val>
-                                        </p:tav>
-                                        <p:tav tm="100000">
-                                          <p:val>
-                                            <p:strVal val="#ppt_y"/>
-                                          </p:val>
-                                        </p:tav>
-                                      </p:tavLst>
-                                    </p:anim>
-                                  </p:childTnLst>
-                                </p:cTn>
-                              </p:par>
-                            </p:childTnLst>
-                          </p:cTn>
-                        </p:par>
-                      </p:childTnLst>
-                    </p:cTn>
-                  </p:par>
-                </p:childTnLst>
-              </p:cTn>
-              <p:prevCondLst>
-                <p:cond evt="onPrev" delay="0">
-                  <p:tgtEl>
-                    <p:sldTgt/>
-                  </p:tgtEl>
-                </p:cond>
-              </p:prevCondLst>
-              <p:nextCondLst>
-                <p:cond evt="onNext" delay="0">
-                  <p:tgtEl>
-                    <p:sldTgt/>
-                  </p:tgtEl>
-                </p:cond>
-              </p:nextCondLst>
-            </p:seq>
-          </p:childTnLst>
-        </p:cTn>
-      </p:par>
-    </p:tnLst>
-    <p:bldLst>
-      <p:bldP spid="4" grpId="0"/>
-      <p:bldP spid="3" grpId="0" build="p"/>
-    </p:bldLst>
-  </p:timing>
-</p:sld>
-</file>
-
 <file path=ppt/theme/theme1.xml><?xml version="1.0" encoding="utf-8"?>
 <a:theme xmlns:a="http://schemas.openxmlformats.org/drawingml/2006/main" name="Ion Boardroom">
   <a:themeElements>

</xml_diff>